<commit_message>
Adding DNS ppt into networking.
</commit_message>
<xml_diff>
--- a/4.Users_And_UsersGroups/04-UsersAndUsersGroups.pptx
+++ b/4.Users_And_UsersGroups/04-UsersAndUsersGroups.pptx
@@ -310,7 +310,7 @@
           <a:p>
             <a:fld id="{3EA744D9-3FBE-48D8-BF2A-85DF203E4D20}" type="datetimeFigureOut">
               <a:rPr lang="bg-BG" smtClean="0"/>
-              <a:t>6.12.2016 г.</a:t>
+              <a:t>20.03.17 г.</a:t>
             </a:fld>
             <a:endParaRPr lang="bg-BG"/>
           </a:p>
@@ -480,7 +480,7 @@
           <a:p>
             <a:fld id="{3EA744D9-3FBE-48D8-BF2A-85DF203E4D20}" type="datetimeFigureOut">
               <a:rPr lang="bg-BG" smtClean="0"/>
-              <a:t>6.12.2016 г.</a:t>
+              <a:t>20.03.17 г.</a:t>
             </a:fld>
             <a:endParaRPr lang="bg-BG"/>
           </a:p>
@@ -660,7 +660,7 @@
           <a:p>
             <a:fld id="{3EA744D9-3FBE-48D8-BF2A-85DF203E4D20}" type="datetimeFigureOut">
               <a:rPr lang="bg-BG" smtClean="0"/>
-              <a:t>6.12.2016 г.</a:t>
+              <a:t>20.03.17 г.</a:t>
             </a:fld>
             <a:endParaRPr lang="bg-BG"/>
           </a:p>
@@ -830,7 +830,7 @@
           <a:p>
             <a:fld id="{3EA744D9-3FBE-48D8-BF2A-85DF203E4D20}" type="datetimeFigureOut">
               <a:rPr lang="bg-BG" smtClean="0"/>
-              <a:t>6.12.2016 г.</a:t>
+              <a:t>20.03.17 г.</a:t>
             </a:fld>
             <a:endParaRPr lang="bg-BG"/>
           </a:p>
@@ -1076,7 +1076,7 @@
           <a:p>
             <a:fld id="{3EA744D9-3FBE-48D8-BF2A-85DF203E4D20}" type="datetimeFigureOut">
               <a:rPr lang="bg-BG" smtClean="0"/>
-              <a:t>6.12.2016 г.</a:t>
+              <a:t>20.03.17 г.</a:t>
             </a:fld>
             <a:endParaRPr lang="bg-BG"/>
           </a:p>
@@ -1364,7 +1364,7 @@
           <a:p>
             <a:fld id="{3EA744D9-3FBE-48D8-BF2A-85DF203E4D20}" type="datetimeFigureOut">
               <a:rPr lang="bg-BG" smtClean="0"/>
-              <a:t>6.12.2016 г.</a:t>
+              <a:t>20.03.17 г.</a:t>
             </a:fld>
             <a:endParaRPr lang="bg-BG"/>
           </a:p>
@@ -1786,7 +1786,7 @@
           <a:p>
             <a:fld id="{3EA744D9-3FBE-48D8-BF2A-85DF203E4D20}" type="datetimeFigureOut">
               <a:rPr lang="bg-BG" smtClean="0"/>
-              <a:t>6.12.2016 г.</a:t>
+              <a:t>20.03.17 г.</a:t>
             </a:fld>
             <a:endParaRPr lang="bg-BG"/>
           </a:p>
@@ -1904,7 +1904,7 @@
           <a:p>
             <a:fld id="{3EA744D9-3FBE-48D8-BF2A-85DF203E4D20}" type="datetimeFigureOut">
               <a:rPr lang="bg-BG" smtClean="0"/>
-              <a:t>6.12.2016 г.</a:t>
+              <a:t>20.03.17 г.</a:t>
             </a:fld>
             <a:endParaRPr lang="bg-BG"/>
           </a:p>
@@ -1999,7 +1999,7 @@
           <a:p>
             <a:fld id="{3EA744D9-3FBE-48D8-BF2A-85DF203E4D20}" type="datetimeFigureOut">
               <a:rPr lang="bg-BG" smtClean="0"/>
-              <a:t>6.12.2016 г.</a:t>
+              <a:t>20.03.17 г.</a:t>
             </a:fld>
             <a:endParaRPr lang="bg-BG"/>
           </a:p>
@@ -2276,7 +2276,7 @@
           <a:p>
             <a:fld id="{3EA744D9-3FBE-48D8-BF2A-85DF203E4D20}" type="datetimeFigureOut">
               <a:rPr lang="bg-BG" smtClean="0"/>
-              <a:t>6.12.2016 г.</a:t>
+              <a:t>20.03.17 г.</a:t>
             </a:fld>
             <a:endParaRPr lang="bg-BG"/>
           </a:p>
@@ -2529,7 +2529,7 @@
           <a:p>
             <a:fld id="{3EA744D9-3FBE-48D8-BF2A-85DF203E4D20}" type="datetimeFigureOut">
               <a:rPr lang="bg-BG" smtClean="0"/>
-              <a:t>6.12.2016 г.</a:t>
+              <a:t>20.03.17 г.</a:t>
             </a:fld>
             <a:endParaRPr lang="bg-BG"/>
           </a:p>
@@ -2751,7 +2751,7 @@
           <a:p>
             <a:fld id="{3EA744D9-3FBE-48D8-BF2A-85DF203E4D20}" type="datetimeFigureOut">
               <a:rPr lang="bg-BG" smtClean="0"/>
-              <a:t>6.12.2016 г.</a:t>
+              <a:t>20.03.17 г.</a:t>
             </a:fld>
             <a:endParaRPr lang="bg-BG"/>
           </a:p>
@@ -3349,15 +3349,15 @@
                   <a:schemeClr val="accent6"/>
                 </a:solidFill>
               </a:rPr>
-              <a:t>In Linux there are privileged users and unprivileged. The default privileged user is “root”. This user has full access to everything on a Linux server and is allowed to work in system space without any restrictions. Be careful if you are logged as </a:t>
+              <a:t>In Linux there are privileged users and unprivileged. The default privileged user is “</a:t>
             </a:r>
             <a:r>
               <a:rPr lang="en-US" sz="2700" dirty="0" smtClean="0">
                 <a:solidFill>
-                  <a:schemeClr val="accent6"/>
-                </a:solidFill>
-              </a:rPr>
-              <a:t>root , </a:t>
+                  <a:schemeClr val="bg1"/>
+                </a:solidFill>
+              </a:rPr>
+              <a:t>root</a:t>
             </a:r>
             <a:r>
               <a:rPr lang="en-US" sz="2700" dirty="0" smtClean="0">
@@ -3365,7 +3365,23 @@
                   <a:schemeClr val="accent6"/>
                 </a:solidFill>
               </a:rPr>
-              <a:t>since each command  that you type is with enough privileges.</a:t>
+              <a:t>”. This user has full access to everything on a Linux server and is allowed to work in </a:t>
+            </a:r>
+            <a:r>
+              <a:rPr lang="en-US" sz="2700" dirty="0" smtClean="0">
+                <a:solidFill>
+                  <a:schemeClr val="bg1"/>
+                </a:solidFill>
+              </a:rPr>
+              <a:t>system space </a:t>
+            </a:r>
+            <a:r>
+              <a:rPr lang="en-US" sz="2700" dirty="0" smtClean="0">
+                <a:solidFill>
+                  <a:schemeClr val="accent6"/>
+                </a:solidFill>
+              </a:rPr>
+              <a:t>without any restrictions. Be careful if you are logged as root , since each command  that you type is with enough privileges.</a:t>
             </a:r>
             <a:r>
               <a:rPr lang="en-US" sz="3100" dirty="0" smtClean="0">
@@ -3423,10 +3439,18 @@
             <a:r>
               <a:rPr lang="en-US" sz="2200" dirty="0" smtClean="0">
                 <a:solidFill>
+                  <a:schemeClr val="accent6"/>
+                </a:solidFill>
+              </a:rPr>
+              <a:t>1. Find information on the internet about the file </a:t>
+            </a:r>
+            <a:r>
+              <a:rPr lang="en-US" sz="2200" dirty="0" smtClean="0">
+                <a:solidFill>
                   <a:schemeClr val="bg1"/>
                 </a:solidFill>
               </a:rPr>
-              <a:t>1. Find information on the internet about the file /</a:t>
+              <a:t>/</a:t>
             </a:r>
             <a:r>
               <a:rPr lang="en-US" sz="2200" dirty="0" err="1" smtClean="0">
@@ -3455,119 +3479,175 @@
             <a:r>
               <a:rPr lang="en-US" sz="2200" dirty="0" smtClean="0">
                 <a:solidFill>
+                  <a:schemeClr val="accent6"/>
+                </a:solidFill>
+              </a:rPr>
+              <a:t>.</a:t>
+            </a:r>
+            <a:r>
+              <a:rPr lang="en-US" sz="2200" dirty="0">
+                <a:solidFill>
                   <a:schemeClr val="bg1"/>
                 </a:solidFill>
               </a:rPr>
-              <a:t>.</a:t>
-            </a:r>
-            <a:r>
+              <a:t/>
+            </a:r>
+            <a:br>
               <a:rPr lang="en-US" sz="2200" dirty="0">
                 <a:solidFill>
                   <a:schemeClr val="bg1"/>
                 </a:solidFill>
               </a:rPr>
-              <a:t/>
-            </a:r>
-            <a:br>
+            </a:br>
+            <a:r>
+              <a:rPr lang="en-US" sz="2200" dirty="0" smtClean="0">
+                <a:solidFill>
+                  <a:schemeClr val="accent6"/>
+                </a:solidFill>
+              </a:rPr>
+              <a:t>2. </a:t>
+            </a:r>
+            <a:r>
               <a:rPr lang="en-US" sz="2200" dirty="0">
                 <a:solidFill>
+                  <a:schemeClr val="accent6"/>
+                </a:solidFill>
+              </a:rPr>
+              <a:t>Cat </a:t>
+            </a:r>
+            <a:r>
+              <a:rPr lang="en-US" sz="2200" dirty="0">
+                <a:solidFill>
                   <a:schemeClr val="bg1"/>
                 </a:solidFill>
               </a:rPr>
+              <a:t>/</a:t>
+            </a:r>
+            <a:r>
+              <a:rPr lang="en-US" sz="2200" dirty="0" err="1">
+                <a:solidFill>
+                  <a:schemeClr val="bg1"/>
+                </a:solidFill>
+              </a:rPr>
+              <a:t>etc</a:t>
+            </a:r>
+            <a:r>
+              <a:rPr lang="en-US" sz="2200" dirty="0">
+                <a:solidFill>
+                  <a:schemeClr val="bg1"/>
+                </a:solidFill>
+              </a:rPr>
+              <a:t>/</a:t>
+            </a:r>
+            <a:r>
+              <a:rPr lang="en-US" sz="2200" dirty="0" err="1">
+                <a:solidFill>
+                  <a:schemeClr val="bg1"/>
+                </a:solidFill>
+              </a:rPr>
+              <a:t>passwd</a:t>
+            </a:r>
+            <a:r>
+              <a:rPr lang="en-US" sz="2200" dirty="0">
+                <a:solidFill>
+                  <a:schemeClr val="bg1"/>
+                </a:solidFill>
+              </a:rPr>
+              <a:t> </a:t>
+            </a:r>
+            <a:r>
+              <a:rPr lang="en-US" sz="2200" dirty="0">
+                <a:solidFill>
+                  <a:schemeClr val="accent6"/>
+                </a:solidFill>
+              </a:rPr>
+              <a:t>and then grep for the root user.</a:t>
+            </a:r>
+            <a:br>
+              <a:rPr lang="en-US" sz="2200" dirty="0">
+                <a:solidFill>
+                  <a:schemeClr val="accent6"/>
+                </a:solidFill>
+              </a:rPr>
             </a:br>
             <a:r>
               <a:rPr lang="en-US" sz="2200" dirty="0" smtClean="0">
                 <a:solidFill>
+                  <a:schemeClr val="accent6"/>
+                </a:solidFill>
+              </a:rPr>
+              <a:t>3. </a:t>
+            </a:r>
+            <a:r>
+              <a:rPr lang="en-US" sz="2200" dirty="0">
+                <a:solidFill>
+                  <a:schemeClr val="accent6"/>
+                </a:solidFill>
+              </a:rPr>
+              <a:t>What is the root user id ? Run ‘</a:t>
+            </a:r>
+            <a:r>
+              <a:rPr lang="en-US" sz="2200" dirty="0">
+                <a:solidFill>
                   <a:schemeClr val="bg1"/>
                 </a:solidFill>
               </a:rPr>
-              <a:t>2. </a:t>
+              <a:t>id root</a:t>
             </a:r>
             <a:r>
               <a:rPr lang="en-US" sz="2200" dirty="0">
                 <a:solidFill>
+                  <a:schemeClr val="accent6"/>
+                </a:solidFill>
+              </a:rPr>
+              <a:t>’</a:t>
+            </a:r>
+            <a:r>
+              <a:rPr lang="en-US" sz="2200" dirty="0">
+                <a:solidFill>
                   <a:schemeClr val="bg1"/>
                 </a:solidFill>
               </a:rPr>
-              <a:t>Cat /</a:t>
-            </a:r>
-            <a:r>
-              <a:rPr lang="en-US" sz="2200" dirty="0" err="1">
+              <a:t/>
+            </a:r>
+            <a:br>
+              <a:rPr lang="en-US" sz="2200" dirty="0">
                 <a:solidFill>
                   <a:schemeClr val="bg1"/>
                 </a:solidFill>
               </a:rPr>
-              <a:t>etc</a:t>
+            </a:br>
+            <a:r>
+              <a:rPr lang="en-US" sz="2200" dirty="0" smtClean="0">
+                <a:solidFill>
+                  <a:schemeClr val="accent6"/>
+                </a:solidFill>
+              </a:rPr>
+              <a:t>4. </a:t>
             </a:r>
             <a:r>
               <a:rPr lang="en-US" sz="2200" dirty="0">
                 <a:solidFill>
+                  <a:schemeClr val="accent6"/>
+                </a:solidFill>
+              </a:rPr>
+              <a:t>Do you think it’s safe to let the root user to log in inside a server from remote</a:t>
+            </a:r>
+            <a:r>
+              <a:rPr lang="en-US" sz="2200" dirty="0">
+                <a:solidFill>
                   <a:schemeClr val="bg1"/>
                 </a:solidFill>
               </a:rPr>
-              <a:t>/</a:t>
-            </a:r>
-            <a:r>
-              <a:rPr lang="en-US" sz="2200" dirty="0" err="1">
-                <a:solidFill>
-                  <a:schemeClr val="bg1"/>
-                </a:solidFill>
-              </a:rPr>
-              <a:t>passwd</a:t>
+              <a:t> </a:t>
             </a:r>
             <a:r>
               <a:rPr lang="en-US" sz="2200" dirty="0">
                 <a:solidFill>
-                  <a:schemeClr val="bg1"/>
-                </a:solidFill>
-              </a:rPr>
-              <a:t> and then grep for the root user.</a:t>
-            </a:r>
-            <a:br>
-              <a:rPr lang="en-US" sz="2200" dirty="0">
-                <a:solidFill>
-                  <a:schemeClr val="bg1"/>
-                </a:solidFill>
-              </a:rPr>
-            </a:br>
-            <a:r>
-              <a:rPr lang="en-US" sz="2200" dirty="0" smtClean="0">
-                <a:solidFill>
-                  <a:schemeClr val="bg1"/>
-                </a:solidFill>
-              </a:rPr>
-              <a:t>3. </a:t>
-            </a:r>
-            <a:r>
-              <a:rPr lang="en-US" sz="2200" dirty="0">
-                <a:solidFill>
-                  <a:schemeClr val="bg1"/>
-                </a:solidFill>
-              </a:rPr>
-              <a:t>What is the root user id ? Run ‘id root’</a:t>
-            </a:r>
-            <a:br>
-              <a:rPr lang="en-US" sz="2200" dirty="0">
-                <a:solidFill>
-                  <a:schemeClr val="bg1"/>
-                </a:solidFill>
-              </a:rPr>
-            </a:br>
-            <a:r>
-              <a:rPr lang="en-US" sz="2200" dirty="0" smtClean="0">
-                <a:solidFill>
-                  <a:schemeClr val="bg1"/>
-                </a:solidFill>
-              </a:rPr>
-              <a:t>4. </a:t>
-            </a:r>
-            <a:r>
-              <a:rPr lang="en-US" sz="2200" dirty="0">
-                <a:solidFill>
-                  <a:schemeClr val="bg1"/>
-                </a:solidFill>
-              </a:rPr>
-              <a:t>Do you think it’s safe to let the root user to log in inside a server from remote ( SSH ) ? </a:t>
+                  <a:schemeClr val="accent6"/>
+                </a:solidFill>
+              </a:rPr>
+              <a:t>( SSH ) ? </a:t>
             </a:r>
             <a:r>
               <a:rPr lang="en-US" dirty="0">
@@ -3734,7 +3814,7 @@
             <a:r>
               <a:rPr lang="en-US" sz="2400" dirty="0" smtClean="0">
                 <a:solidFill>
-                  <a:schemeClr val="accent6"/>
+                  <a:schemeClr val="bg1"/>
                 </a:solidFill>
               </a:rPr>
               <a:t>/</a:t>
@@ -3742,7 +3822,7 @@
             <a:r>
               <a:rPr lang="en-US" sz="2400" dirty="0" err="1" smtClean="0">
                 <a:solidFill>
-                  <a:schemeClr val="accent6"/>
+                  <a:schemeClr val="bg1"/>
                 </a:solidFill>
               </a:rPr>
               <a:t>etc</a:t>
@@ -3750,7 +3830,7 @@
             <a:r>
               <a:rPr lang="en-US" sz="2400" dirty="0" smtClean="0">
                 <a:solidFill>
-                  <a:schemeClr val="accent6"/>
+                  <a:schemeClr val="bg1"/>
                 </a:solidFill>
               </a:rPr>
               <a:t>/</a:t>
@@ -3758,7 +3838,7 @@
             <a:r>
               <a:rPr lang="en-US" sz="2400" dirty="0" err="1" smtClean="0">
                 <a:solidFill>
-                  <a:schemeClr val="accent6"/>
+                  <a:schemeClr val="bg1"/>
                 </a:solidFill>
               </a:rPr>
               <a:t>passwd</a:t>
@@ -3766,10 +3846,18 @@
             <a:r>
               <a:rPr lang="en-US" sz="2400" dirty="0" smtClean="0">
                 <a:solidFill>
-                  <a:schemeClr val="accent6"/>
-                </a:solidFill>
-              </a:rPr>
-              <a:t> =&gt; information about each user is stored there.</a:t>
+                  <a:schemeClr val="bg1"/>
+                </a:solidFill>
+              </a:rPr>
+              <a:t> </a:t>
+            </a:r>
+            <a:r>
+              <a:rPr lang="en-US" sz="2400" dirty="0" smtClean="0">
+                <a:solidFill>
+                  <a:schemeClr val="accent6"/>
+                </a:solidFill>
+              </a:rPr>
+              <a:t>=&gt; information about each user is stored there.</a:t>
             </a:r>
             <a:endParaRPr lang="en-US" sz="2400" dirty="0">
               <a:solidFill>
@@ -4182,7 +4270,7 @@
             <a:r>
               <a:rPr lang="en-US" dirty="0" smtClean="0">
                 <a:solidFill>
-                  <a:schemeClr val="accent6"/>
+                  <a:schemeClr val="bg1"/>
                 </a:solidFill>
               </a:rPr>
               <a:t>/</a:t>
@@ -4190,7 +4278,7 @@
             <a:r>
               <a:rPr lang="en-US" dirty="0" err="1" smtClean="0">
                 <a:solidFill>
-                  <a:schemeClr val="accent6"/>
+                  <a:schemeClr val="bg1"/>
                 </a:solidFill>
               </a:rPr>
               <a:t>etc</a:t>
@@ -4198,10 +4286,18 @@
             <a:r>
               <a:rPr lang="en-US" dirty="0" smtClean="0">
                 <a:solidFill>
-                  <a:schemeClr val="accent6"/>
-                </a:solidFill>
-              </a:rPr>
-              <a:t>/shadow =&gt; encrypted passwords of users are stored here. </a:t>
+                  <a:schemeClr val="bg1"/>
+                </a:solidFill>
+              </a:rPr>
+              <a:t>/shadow </a:t>
+            </a:r>
+            <a:r>
+              <a:rPr lang="en-US" dirty="0" smtClean="0">
+                <a:solidFill>
+                  <a:schemeClr val="accent6"/>
+                </a:solidFill>
+              </a:rPr>
+              <a:t>=&gt; encrypted passwords of users are stored here. </a:t>
             </a:r>
             <a:r>
               <a:rPr lang="en-US" dirty="0">
@@ -4751,10 +4847,26 @@
             <a:r>
               <a:rPr lang="en-US" sz="2700" dirty="0" smtClean="0">
                 <a:solidFill>
+                  <a:schemeClr val="accent6"/>
+                </a:solidFill>
+              </a:rPr>
+              <a:t>1. Add a user with ‘</a:t>
+            </a:r>
+            <a:r>
+              <a:rPr lang="en-US" sz="2700" dirty="0" err="1" smtClean="0">
+                <a:solidFill>
                   <a:schemeClr val="bg1"/>
                 </a:solidFill>
               </a:rPr>
-              <a:t>1. Add a user with ‘</a:t>
+              <a:t>useradd</a:t>
+            </a:r>
+            <a:r>
+              <a:rPr lang="en-US" sz="2700" dirty="0" smtClean="0">
+                <a:solidFill>
+                  <a:schemeClr val="bg1"/>
+                </a:solidFill>
+              </a:rPr>
+              <a:t> </a:t>
             </a:r>
             <a:r>
               <a:rPr lang="en-US" sz="2700" dirty="0" err="1" smtClean="0">
@@ -4762,125 +4874,133 @@
                   <a:schemeClr val="bg1"/>
                 </a:solidFill>
               </a:rPr>
-              <a:t>useradd</a:t>
+              <a:t>user_name</a:t>
             </a:r>
             <a:r>
               <a:rPr lang="en-US" sz="2700" dirty="0" smtClean="0">
                 <a:solidFill>
+                  <a:schemeClr val="accent6"/>
+                </a:solidFill>
+              </a:rPr>
+              <a:t>’.</a:t>
+            </a:r>
+            <a:r>
+              <a:rPr lang="en-US" sz="2700" dirty="0" smtClean="0">
+                <a:solidFill>
                   <a:schemeClr val="bg1"/>
                 </a:solidFill>
               </a:rPr>
-              <a:t> </a:t>
-            </a:r>
-            <a:r>
-              <a:rPr lang="en-US" sz="2700" dirty="0" err="1" smtClean="0">
+              <a:t/>
+            </a:r>
+            <a:br>
+              <a:rPr lang="en-US" sz="2700" dirty="0" smtClean="0">
                 <a:solidFill>
                   <a:schemeClr val="bg1"/>
                 </a:solidFill>
               </a:rPr>
-              <a:t>user_name</a:t>
-            </a:r>
+            </a:br>
             <a:r>
               <a:rPr lang="en-US" sz="2700" dirty="0" smtClean="0">
                 <a:solidFill>
+                  <a:schemeClr val="accent6"/>
+                </a:solidFill>
+              </a:rPr>
+              <a:t>2. Run the </a:t>
+            </a:r>
+            <a:r>
+              <a:rPr lang="en-US" sz="2700" dirty="0" smtClean="0">
+                <a:solidFill>
                   <a:schemeClr val="bg1"/>
                 </a:solidFill>
               </a:rPr>
-              <a:t>’.</a:t>
-            </a:r>
-            <a:br>
+              <a:t>id </a:t>
+            </a:r>
+            <a:r>
               <a:rPr lang="en-US" sz="2700" dirty="0" smtClean="0">
                 <a:solidFill>
-                  <a:schemeClr val="bg1"/>
-                </a:solidFill>
-              </a:rPr>
-            </a:br>
-            <a:r>
+                  <a:schemeClr val="accent6"/>
+                </a:solidFill>
+              </a:rPr>
+              <a:t>command on that user.</a:t>
+            </a:r>
+            <a:br>
               <a:rPr lang="en-US" sz="2700" dirty="0" smtClean="0">
                 <a:solidFill>
-                  <a:schemeClr val="bg1"/>
-                </a:solidFill>
-              </a:rPr>
-              <a:t>2. Run the id command on that user.</a:t>
-            </a:r>
-            <a:br>
+                  <a:schemeClr val="accent6"/>
+                </a:solidFill>
+              </a:rPr>
+            </a:br>
+            <a:r>
               <a:rPr lang="en-US" sz="2700" dirty="0" smtClean="0">
                 <a:solidFill>
-                  <a:schemeClr val="bg1"/>
-                </a:solidFill>
-              </a:rPr>
-            </a:br>
-            <a:r>
+                  <a:schemeClr val="accent6"/>
+                </a:solidFill>
+              </a:rPr>
+              <a:t>3. In which file do you think that groups are stored ?</a:t>
+            </a:r>
+            <a:br>
               <a:rPr lang="en-US" sz="2700" dirty="0" smtClean="0">
                 <a:solidFill>
-                  <a:schemeClr val="bg1"/>
-                </a:solidFill>
-              </a:rPr>
-              <a:t>3. In which file do you think that groups are stored ?</a:t>
-            </a:r>
-            <a:br>
+                  <a:schemeClr val="accent6"/>
+                </a:solidFill>
+              </a:rPr>
+            </a:br>
+            <a:r>
               <a:rPr lang="en-US" sz="2700" dirty="0" smtClean="0">
                 <a:solidFill>
-                  <a:schemeClr val="bg1"/>
-                </a:solidFill>
-              </a:rPr>
-            </a:br>
-            <a:r>
+                  <a:schemeClr val="accent6"/>
+                </a:solidFill>
+              </a:rPr>
+              <a:t>4. Create two groups sales and account. </a:t>
+            </a:r>
+            <a:br>
               <a:rPr lang="en-US" sz="2700" dirty="0" smtClean="0">
                 <a:solidFill>
-                  <a:schemeClr val="bg1"/>
-                </a:solidFill>
-              </a:rPr>
-              <a:t>4. Create two groups sales and account. </a:t>
-            </a:r>
-            <a:br>
+                  <a:schemeClr val="accent6"/>
+                </a:solidFill>
+              </a:rPr>
+            </a:br>
+            <a:r>
               <a:rPr lang="en-US" sz="2700" dirty="0" smtClean="0">
                 <a:solidFill>
-                  <a:schemeClr val="bg1"/>
-                </a:solidFill>
-              </a:rPr>
-            </a:br>
-            <a:r>
+                  <a:schemeClr val="accent6"/>
+                </a:solidFill>
+              </a:rPr>
+              <a:t>5. Create users bob, betty, bill and Beatrix.</a:t>
+            </a:r>
+            <a:br>
               <a:rPr lang="en-US" sz="2700" dirty="0" smtClean="0">
                 <a:solidFill>
-                  <a:schemeClr val="bg1"/>
-                </a:solidFill>
-              </a:rPr>
-              <a:t>5. Create users bob, betty, bill and Beatrix.</a:t>
-            </a:r>
-            <a:br>
+                  <a:schemeClr val="accent6"/>
+                </a:solidFill>
+              </a:rPr>
+            </a:br>
+            <a:r>
               <a:rPr lang="en-US" sz="2700" dirty="0" smtClean="0">
                 <a:solidFill>
-                  <a:schemeClr val="bg1"/>
-                </a:solidFill>
-              </a:rPr>
-            </a:br>
-            <a:r>
+                  <a:schemeClr val="accent6"/>
+                </a:solidFill>
+              </a:rPr>
+              <a:t>6. Make bob and betty members of the group sales, and bill and Beatrix member of the group account.</a:t>
+            </a:r>
+            <a:br>
               <a:rPr lang="en-US" sz="2700" dirty="0" smtClean="0">
                 <a:solidFill>
-                  <a:schemeClr val="bg1"/>
-                </a:solidFill>
-              </a:rPr>
-              <a:t>6. Make bob and betty members of the group sales, and bill and Beatrix member of the group account.</a:t>
-            </a:r>
-            <a:br>
+                  <a:schemeClr val="accent6"/>
+                </a:solidFill>
+              </a:rPr>
+            </a:br>
+            <a:r>
               <a:rPr lang="en-US" sz="2700" dirty="0" smtClean="0">
                 <a:solidFill>
-                  <a:schemeClr val="bg1"/>
-                </a:solidFill>
-              </a:rPr>
-            </a:br>
-            <a:r>
-              <a:rPr lang="en-US" sz="2700" dirty="0" smtClean="0">
-                <a:solidFill>
-                  <a:schemeClr val="bg1"/>
+                  <a:schemeClr val="accent6"/>
                 </a:solidFill>
               </a:rPr>
               <a:t>7. Set a password policy that requires users to change their password every 90 days. </a:t>
             </a:r>
             <a:endParaRPr lang="bg-BG" sz="3100" dirty="0">
               <a:solidFill>
-                <a:schemeClr val="bg1"/>
+                <a:schemeClr val="accent6"/>
               </a:solidFill>
             </a:endParaRPr>
           </a:p>
@@ -5480,10 +5600,18 @@
             <a:r>
               <a:rPr lang="en-US" sz="2400" dirty="0" smtClean="0">
                 <a:solidFill>
+                  <a:srgbClr val="FF0000"/>
+                </a:solidFill>
+              </a:rPr>
+              <a:t>Exercises:</a:t>
+            </a:r>
+            <a:r>
+              <a:rPr lang="en-US" sz="2400" dirty="0" smtClean="0">
+                <a:solidFill>
                   <a:schemeClr val="bg1"/>
                 </a:solidFill>
               </a:rPr>
-              <a:t>Exercise:</a:t>
+              <a:t/>
             </a:r>
             <a:br>
               <a:rPr lang="en-US" sz="2400" dirty="0" smtClean="0">
@@ -5498,14 +5626,61 @@
                   <a:schemeClr val="bg1"/>
                 </a:solidFill>
               </a:rPr>
-              <a:t>                                               1. Add a local user as a </a:t>
+              <a:t>                                               </a:t>
+            </a:r>
+            <a:r>
+              <a:rPr lang="en-US" sz="2400" dirty="0" smtClean="0">
+                <a:solidFill>
+                  <a:schemeClr val="accent6"/>
+                </a:solidFill>
+              </a:rPr>
+              <a:t>1. Add a local user as a </a:t>
             </a:r>
             <a:r>
               <a:rPr lang="en-US" sz="2400" dirty="0" err="1" smtClean="0">
                 <a:solidFill>
+                  <a:schemeClr val="accent6"/>
+                </a:solidFill>
+              </a:rPr>
+              <a:t>sudo</a:t>
+            </a:r>
+            <a:r>
+              <a:rPr lang="en-US" sz="2400" dirty="0" smtClean="0">
+                <a:solidFill>
+                  <a:schemeClr val="accent6"/>
+                </a:solidFill>
+              </a:rPr>
+              <a:t>.</a:t>
+            </a:r>
+            <a:br>
+              <a:rPr lang="en-US" sz="2400" dirty="0" smtClean="0">
+                <a:solidFill>
+                  <a:schemeClr val="accent6"/>
+                </a:solidFill>
+              </a:rPr>
+            </a:br>
+            <a:r>
+              <a:rPr lang="en-US" sz="2400" dirty="0" smtClean="0">
+                <a:solidFill>
                   <a:schemeClr val="bg1"/>
                 </a:solidFill>
               </a:rPr>
+              <a:t>                                 </a:t>
+            </a:r>
+            <a:r>
+              <a:rPr lang="en-US" sz="2400" dirty="0" smtClean="0">
+                <a:solidFill>
+                  <a:schemeClr val="accent6"/>
+                </a:solidFill>
+              </a:rPr>
+              <a:t>2. Run ‘</a:t>
+            </a:r>
+            <a:r>
+              <a:rPr lang="en-US" sz="2400" dirty="0" err="1" smtClean="0">
+                <a:solidFill>
+                  <a:schemeClr val="bg1"/>
+                </a:solidFill>
+              </a:rPr>
               <a:t>sudo</a:t>
             </a:r>
             <a:r>
@@ -5514,54 +5689,31 @@
                   <a:schemeClr val="bg1"/>
                 </a:solidFill>
               </a:rPr>
-              <a:t>.</a:t>
-            </a:r>
-            <a:br>
+              <a:t> </a:t>
+            </a:r>
+            <a:r>
+              <a:rPr lang="en-US" sz="2400" dirty="0" err="1" smtClean="0">
+                <a:solidFill>
+                  <a:schemeClr val="bg1"/>
+                </a:solidFill>
+              </a:rPr>
+              <a:t>whoami</a:t>
+            </a:r>
+            <a:r>
               <a:rPr lang="en-US" sz="2400" dirty="0" smtClean="0">
                 <a:solidFill>
+                  <a:schemeClr val="accent6"/>
+                </a:solidFill>
+              </a:rPr>
+              <a:t>’</a:t>
+            </a:r>
+            <a:r>
+              <a:rPr lang="en-US" sz="2400" dirty="0" smtClean="0">
+                <a:solidFill>
                   <a:schemeClr val="bg1"/>
                 </a:solidFill>
               </a:rPr>
-            </a:br>
-            <a:r>
-              <a:rPr lang="en-US" sz="2400" dirty="0" smtClean="0">
-                <a:solidFill>
-                  <a:schemeClr val="bg1"/>
-                </a:solidFill>
-              </a:rPr>
-              <a:t>                                 2. Run ‘</a:t>
-            </a:r>
-            <a:r>
-              <a:rPr lang="en-US" sz="2400" dirty="0" err="1" smtClean="0">
-                <a:solidFill>
-                  <a:schemeClr val="bg1"/>
-                </a:solidFill>
-              </a:rPr>
-              <a:t>sudo</a:t>
-            </a:r>
-            <a:r>
-              <a:rPr lang="en-US" sz="2400" dirty="0" smtClean="0">
-                <a:solidFill>
-                  <a:schemeClr val="bg1"/>
-                </a:solidFill>
-              </a:rPr>
-              <a:t> </a:t>
-            </a:r>
-            <a:r>
-              <a:rPr lang="en-US" sz="2400" dirty="0" err="1" smtClean="0">
-                <a:solidFill>
-                  <a:schemeClr val="bg1"/>
-                </a:solidFill>
-              </a:rPr>
-              <a:t>whoami</a:t>
-            </a:r>
-            <a:r>
-              <a:rPr lang="en-US" sz="2400" dirty="0" smtClean="0">
-                <a:solidFill>
-                  <a:schemeClr val="bg1"/>
-                </a:solidFill>
-              </a:rPr>
-              <a:t>’</a:t>
+              <a:t/>
             </a:r>
             <a:br>
               <a:rPr lang="en-US" sz="2400" dirty="0" smtClean="0">
@@ -6153,7 +6305,15 @@
                   <a:schemeClr val="bg1"/>
                 </a:solidFill>
               </a:rPr>
-              <a:t>			Exercises:</a:t>
+              <a:t>		</a:t>
+            </a:r>
+            <a:r>
+              <a:rPr lang="en-US" dirty="0" smtClean="0">
+                <a:solidFill>
+                  <a:srgbClr val="FF0000"/>
+                </a:solidFill>
+              </a:rPr>
+              <a:t>	Exercises:</a:t>
             </a:r>
           </a:p>
           <a:p>
@@ -6163,7 +6323,7 @@
             <a:r>
               <a:rPr lang="en-US" dirty="0" smtClean="0">
                 <a:solidFill>
-                  <a:schemeClr val="bg1"/>
+                  <a:schemeClr val="accent6"/>
                 </a:solidFill>
               </a:rPr>
               <a:t>List all users starting with ‘r’.</a:t>
@@ -6176,7 +6336,7 @@
             <a:r>
               <a:rPr lang="en-US" dirty="0" smtClean="0">
                 <a:solidFill>
-                  <a:schemeClr val="bg1"/>
+                  <a:schemeClr val="accent6"/>
                 </a:solidFill>
               </a:rPr>
               <a:t>List all files ending in ‘</a:t>
@@ -6184,7 +6344,7 @@
             <a:r>
               <a:rPr lang="en-US" dirty="0" err="1" smtClean="0">
                 <a:solidFill>
-                  <a:schemeClr val="bg1"/>
+                  <a:schemeClr val="accent6"/>
                 </a:solidFill>
               </a:rPr>
               <a:t>sh</a:t>
@@ -6192,7 +6352,7 @@
             <a:r>
               <a:rPr lang="en-US" dirty="0" smtClean="0">
                 <a:solidFill>
-                  <a:schemeClr val="bg1"/>
+                  <a:schemeClr val="accent6"/>
                 </a:solidFill>
               </a:rPr>
               <a:t>’.</a:t>
@@ -6403,7 +6563,7 @@
         <p:spPr>
           <a:xfrm>
             <a:off x="495300" y="1043970"/>
-            <a:ext cx="8915400" cy="6740307"/>
+            <a:ext cx="8915400" cy="6463308"/>
           </a:xfrm>
           <a:prstGeom prst="rect">
             <a:avLst/>
@@ -6628,49 +6788,17 @@
             </a:r>
           </a:p>
           <a:p>
-            <a:r>
-              <a:rPr lang="en-US" dirty="0">
-                <a:solidFill>
-                  <a:schemeClr val="bg1"/>
-                </a:solidFill>
-              </a:rPr>
-              <a:t> </a:t>
-            </a:r>
-            <a:r>
-              <a:rPr lang="en-US" dirty="0" smtClean="0">
-                <a:solidFill>
-                  <a:schemeClr val="bg1"/>
-                </a:solidFill>
-              </a:rPr>
-              <a:t>       </a:t>
-            </a:r>
-            <a:r>
-              <a:rPr lang="en-US" dirty="0" smtClean="0">
-                <a:solidFill>
-                  <a:schemeClr val="bg1"/>
-                </a:solidFill>
-                <a:hlinkClick r:id="rId2"/>
-              </a:rPr>
-              <a:t>mail=somemail@gmail.com</a:t>
-            </a:r>
-            <a:endParaRPr lang="en-US" dirty="0" smtClean="0">
+            <a:endParaRPr lang="en-US" dirty="0">
               <a:solidFill>
-                <a:schemeClr val="bg1"/>
+                <a:schemeClr val="accent6"/>
               </a:solidFill>
             </a:endParaRPr>
           </a:p>
           <a:p>
-            <a:endParaRPr lang="en-US" dirty="0">
-              <a:solidFill>
-                <a:schemeClr val="bg1"/>
-              </a:solidFill>
-            </a:endParaRPr>
-          </a:p>
-          <a:p>
-            <a:r>
-              <a:rPr lang="en-US" dirty="0" smtClean="0">
-                <a:solidFill>
-                  <a:schemeClr val="bg1"/>
+            <a:r>
+              <a:rPr lang="en-US" dirty="0" smtClean="0">
+                <a:solidFill>
+                  <a:schemeClr val="accent6"/>
                 </a:solidFill>
               </a:rPr>
               <a:t>Homework:</a:t>
@@ -6683,7 +6811,7 @@
             <a:r>
               <a:rPr lang="en-US" dirty="0" smtClean="0">
                 <a:solidFill>
-                  <a:schemeClr val="bg1"/>
+                  <a:schemeClr val="accent6"/>
                 </a:solidFill>
               </a:rPr>
               <a:t>Review the </a:t>
@@ -6691,7 +6819,7 @@
             <a:r>
               <a:rPr lang="en-US" dirty="0" err="1" smtClean="0">
                 <a:solidFill>
-                  <a:schemeClr val="bg1"/>
+                  <a:schemeClr val="accent6"/>
                 </a:solidFill>
               </a:rPr>
               <a:t>previos</a:t>
@@ -6699,7 +6827,7 @@
             <a:r>
               <a:rPr lang="en-US" dirty="0" smtClean="0">
                 <a:solidFill>
-                  <a:schemeClr val="bg1"/>
+                  <a:schemeClr val="accent6"/>
                 </a:solidFill>
               </a:rPr>
               <a:t> three slides + this one and think about what’s most challenging for you? Try to understand something more about it, implemented in the VM, ask me questions.</a:t>

</xml_diff>